<commit_message>
FIX, Bericht angepasst & erweitert
</commit_message>
<xml_diff>
--- a/Präsentation/Präsentation.pptx
+++ b/Präsentation/Präsentation.pptx
@@ -8195,32 +8195,19 @@
               <a:rPr lang="de-DE" dirty="0" smtClean="0"/>
               <a:t>Systems</a:t>
             </a:r>
-            <a:endParaRPr lang="de-DE" dirty="0" smtClean="0"/>
           </a:p>
           <a:p>
             <a:pPr lvl="1"/>
             <a:r>
               <a:rPr lang="de-DE" dirty="0" smtClean="0"/>
-              <a:t>Komponentenentwurf </a:t>
-            </a:r>
+              <a:t>Komponentenentwurf (TODO UPDATE DIAGRAM)</a:t>
+            </a:r>
+          </a:p>
+          <a:p>
+            <a:pPr lvl="1"/>
             <a:r>
               <a:rPr lang="de-DE" dirty="0" smtClean="0"/>
-              <a:t>(TODO UPDATE DIAGRAM</a:t>
-            </a:r>
-            <a:r>
-              <a:rPr lang="de-DE" dirty="0" smtClean="0"/>
-              <a:t>)</a:t>
-            </a:r>
-          </a:p>
-          <a:p>
-            <a:pPr lvl="1"/>
-            <a:r>
-              <a:rPr lang="de-DE" dirty="0" smtClean="0"/>
-              <a:t>Klassendiagramm </a:t>
-            </a:r>
-            <a:r>
-              <a:rPr lang="de-DE" dirty="0" smtClean="0"/>
-              <a:t>der </a:t>
+              <a:t>Klassendiagramm der </a:t>
             </a:r>
             <a:r>
               <a:rPr lang="de-DE" dirty="0" err="1" smtClean="0"/>
@@ -8231,11 +8218,7 @@
           <a:p>
             <a:r>
               <a:rPr lang="de-DE" dirty="0" smtClean="0"/>
-              <a:t>Konzept </a:t>
-            </a:r>
-            <a:r>
-              <a:rPr lang="de-DE" dirty="0" smtClean="0"/>
-              <a:t>(Page-Flow)</a:t>
+              <a:t>Konzept (Page-Flow)</a:t>
             </a:r>
           </a:p>
           <a:p>
@@ -8954,8 +8937,8 @@
         </p:blipFill>
         <p:spPr>
           <a:xfrm>
-            <a:off x="1062120" y="2438399"/>
-            <a:ext cx="11078568" cy="4341342"/>
+            <a:off x="1070001" y="2438399"/>
+            <a:ext cx="11062806" cy="4341342"/>
           </a:xfrm>
         </p:spPr>
       </p:pic>
@@ -9052,11 +9035,7 @@
           <a:p>
             <a:r>
               <a:rPr lang="de-DE" dirty="0" smtClean="0"/>
-              <a:t>Lesender und schreibender Zugriff streng getrennt (CQRS</a:t>
-            </a:r>
-            <a:r>
-              <a:rPr lang="de-DE" dirty="0" smtClean="0"/>
-              <a:t>)</a:t>
+              <a:t>Lesender und schreibender Zugriff streng getrennt (CQRS)</a:t>
             </a:r>
           </a:p>
           <a:p>

</xml_diff>

<commit_message>
FIXES in Diagrammen, in Präsi & Doku aufgenommen
</commit_message>
<xml_diff>
--- a/Präsentation/Präsentation.pptx
+++ b/Präsentation/Präsentation.pptx
@@ -121,7 +121,7 @@
   </p:defaultTextStyle>
   <p:extLst>
     <p:ext uri="{EFAFB233-063F-42B5-8137-9DF3F51BA10A}">
-      <p15:sldGuideLst xmlns:p15="http://schemas.microsoft.com/office/powerpoint/2012/main" xmlns="">
+      <p15:sldGuideLst xmlns:p15="http://schemas.microsoft.com/office/powerpoint/2012/main">
         <p15:guide id="1" orient="horz" pos="2160">
           <p15:clr>
             <a:srgbClr val="A4A3A4"/>
@@ -220,7 +220,7 @@
           <a:p>
             <a:fld id="{DABCB6A0-074C-4374-A4F4-2E95E7EBA89D}" type="datetimeFigureOut">
               <a:rPr lang="en-GB" smtClean="0"/>
-              <a:t>21/03/2015</a:t>
+              <a:t>22/03/2015</a:t>
             </a:fld>
             <a:endParaRPr lang="en-GB"/>
           </a:p>
@@ -1243,7 +1243,7 @@
             <a:fld id="{B61BEF0D-F0BB-DE4B-95CE-6DB70DBA9567}" type="datetimeFigureOut">
               <a:rPr lang="en-US"/>
               <a:pPr/>
-              <a:t>3/21/2015</a:t>
+              <a:t>3/22/2015</a:t>
             </a:fld>
             <a:endParaRPr lang="en-US"/>
           </a:p>
@@ -1566,7 +1566,7 @@
             <a:fld id="{B61BEF0D-F0BB-DE4B-95CE-6DB70DBA9567}" type="datetimeFigureOut">
               <a:rPr lang="en-US"/>
               <a:pPr/>
-              <a:t>3/21/2015</a:t>
+              <a:t>3/22/2015</a:t>
             </a:fld>
             <a:endParaRPr lang="en-US"/>
           </a:p>
@@ -1841,7 +1841,7 @@
             <a:fld id="{B61BEF0D-F0BB-DE4B-95CE-6DB70DBA9567}" type="datetimeFigureOut">
               <a:rPr lang="en-US"/>
               <a:pPr/>
-              <a:t>3/21/2015</a:t>
+              <a:t>3/22/2015</a:t>
             </a:fld>
             <a:endParaRPr lang="en-US"/>
           </a:p>
@@ -2408,7 +2408,7 @@
             <a:fld id="{B61BEF0D-F0BB-DE4B-95CE-6DB70DBA9567}" type="datetimeFigureOut">
               <a:rPr lang="en-US"/>
               <a:pPr/>
-              <a:t>3/21/2015</a:t>
+              <a:t>3/22/2015</a:t>
             </a:fld>
             <a:endParaRPr lang="en-US"/>
           </a:p>
@@ -2683,7 +2683,7 @@
             <a:fld id="{B61BEF0D-F0BB-DE4B-95CE-6DB70DBA9567}" type="datetimeFigureOut">
               <a:rPr lang="en-US"/>
               <a:pPr/>
-              <a:t>3/21/2015</a:t>
+              <a:t>3/22/2015</a:t>
             </a:fld>
             <a:endParaRPr lang="en-US"/>
           </a:p>
@@ -3242,7 +3242,7 @@
             <a:fld id="{B61BEF0D-F0BB-DE4B-95CE-6DB70DBA9567}" type="datetimeFigureOut">
               <a:rPr lang="en-US"/>
               <a:pPr/>
-              <a:t>3/21/2015</a:t>
+              <a:t>3/22/2015</a:t>
             </a:fld>
             <a:endParaRPr lang="en-US"/>
           </a:p>
@@ -3566,7 +3566,7 @@
             <a:fld id="{B61BEF0D-F0BB-DE4B-95CE-6DB70DBA9567}" type="datetimeFigureOut">
               <a:rPr lang="en-US"/>
               <a:pPr/>
-              <a:t>3/21/2015</a:t>
+              <a:t>3/22/2015</a:t>
             </a:fld>
             <a:endParaRPr lang="en-US"/>
           </a:p>
@@ -3767,7 +3767,7 @@
             <a:fld id="{B61BEF0D-F0BB-DE4B-95CE-6DB70DBA9567}" type="datetimeFigureOut">
               <a:rPr lang="en-US"/>
               <a:pPr/>
-              <a:t>3/21/2015</a:t>
+              <a:t>3/22/2015</a:t>
             </a:fld>
             <a:endParaRPr lang="en-US"/>
           </a:p>
@@ -3974,7 +3974,7 @@
             <a:fld id="{B61BEF0D-F0BB-DE4B-95CE-6DB70DBA9567}" type="datetimeFigureOut">
               <a:rPr lang="en-US"/>
               <a:pPr/>
-              <a:t>3/21/2015</a:t>
+              <a:t>3/22/2015</a:t>
             </a:fld>
             <a:endParaRPr lang="en-US"/>
           </a:p>
@@ -4171,7 +4171,7 @@
             <a:fld id="{B61BEF0D-F0BB-DE4B-95CE-6DB70DBA9567}" type="datetimeFigureOut">
               <a:rPr lang="en-US"/>
               <a:pPr/>
-              <a:t>3/21/2015</a:t>
+              <a:t>3/22/2015</a:t>
             </a:fld>
             <a:endParaRPr lang="en-US"/>
           </a:p>
@@ -4449,7 +4449,7 @@
             <a:fld id="{B61BEF0D-F0BB-DE4B-95CE-6DB70DBA9567}" type="datetimeFigureOut">
               <a:rPr lang="en-US"/>
               <a:pPr/>
-              <a:t>3/21/2015</a:t>
+              <a:t>3/22/2015</a:t>
             </a:fld>
             <a:endParaRPr lang="en-US"/>
           </a:p>
@@ -4773,7 +4773,7 @@
             <a:fld id="{B61BEF0D-F0BB-DE4B-95CE-6DB70DBA9567}" type="datetimeFigureOut">
               <a:rPr lang="en-US"/>
               <a:pPr/>
-              <a:t>3/21/2015</a:t>
+              <a:t>3/22/2015</a:t>
             </a:fld>
             <a:endParaRPr lang="en-US"/>
           </a:p>
@@ -5242,7 +5242,7 @@
             <a:fld id="{B61BEF0D-F0BB-DE4B-95CE-6DB70DBA9567}" type="datetimeFigureOut">
               <a:rPr lang="en-US"/>
               <a:pPr/>
-              <a:t>3/21/2015</a:t>
+              <a:t>3/22/2015</a:t>
             </a:fld>
             <a:endParaRPr lang="en-US"/>
           </a:p>
@@ -5387,7 +5387,7 @@
             <a:fld id="{B61BEF0D-F0BB-DE4B-95CE-6DB70DBA9567}" type="datetimeFigureOut">
               <a:rPr lang="en-US"/>
               <a:pPr/>
-              <a:t>3/21/2015</a:t>
+              <a:t>3/22/2015</a:t>
             </a:fld>
             <a:endParaRPr lang="en-US"/>
           </a:p>
@@ -5509,7 +5509,7 @@
             <a:fld id="{B61BEF0D-F0BB-DE4B-95CE-6DB70DBA9567}" type="datetimeFigureOut">
               <a:rPr lang="en-US"/>
               <a:pPr/>
-              <a:t>3/21/2015</a:t>
+              <a:t>3/22/2015</a:t>
             </a:fld>
             <a:endParaRPr lang="en-US"/>
           </a:p>
@@ -5820,7 +5820,7 @@
             <a:fld id="{B61BEF0D-F0BB-DE4B-95CE-6DB70DBA9567}" type="datetimeFigureOut">
               <a:rPr lang="en-US"/>
               <a:pPr/>
-              <a:t>3/21/2015</a:t>
+              <a:t>3/22/2015</a:t>
             </a:fld>
             <a:endParaRPr lang="en-US"/>
           </a:p>
@@ -6138,7 +6138,7 @@
             <a:fld id="{B61BEF0D-F0BB-DE4B-95CE-6DB70DBA9567}" type="datetimeFigureOut">
               <a:rPr lang="en-US"/>
               <a:pPr/>
-              <a:t>3/21/2015</a:t>
+              <a:t>3/22/2015</a:t>
             </a:fld>
             <a:endParaRPr lang="en-US"/>
           </a:p>
@@ -6695,7 +6695,7 @@
             <a:fld id="{B61BEF0D-F0BB-DE4B-95CE-6DB70DBA9567}" type="datetimeFigureOut">
               <a:rPr lang="en-US"/>
               <a:pPr/>
-              <a:t>3/21/2015</a:t>
+              <a:t>3/22/2015</a:t>
             </a:fld>
             <a:endParaRPr lang="en-US"/>
           </a:p>
@@ -9013,7 +9013,7 @@
         <p:spPr>
           <a:xfrm>
             <a:off x="5309657" y="761999"/>
-            <a:ext cx="6701367" cy="5960163"/>
+            <a:ext cx="6701367" cy="5960162"/>
           </a:xfrm>
         </p:spPr>
       </p:pic>
@@ -9352,7 +9352,7 @@
   <a:extraClrSchemeLst/>
   <a:extLst>
     <a:ext uri="{05A4C25C-085E-4340-85A3-A5531E510DB2}">
-      <thm15:themeFamily xmlns:thm15="http://schemas.microsoft.com/office/thememl/2012/main" xmlns="" name="Parallax" id="{3388167B-A2EB-4685-9635-1831D9AEF8C4}" vid="{4F7A876A-7598-49CA-AFC8-8EDA2551E4A7}"/>
+      <thm15:themeFamily xmlns:thm15="http://schemas.microsoft.com/office/thememl/2012/main" name="Parallax" id="{3388167B-A2EB-4685-9635-1831D9AEF8C4}" vid="{4F7A876A-7598-49CA-AFC8-8EDA2551E4A7}"/>
     </a:ext>
   </a:extLst>
 </a:theme>
@@ -9613,7 +9613,7 @@
   <a:extraClrSchemeLst/>
   <a:extLst>
     <a:ext uri="{05A4C25C-085E-4340-85A3-A5531E510DB2}">
-      <thm15:themeFamily xmlns:thm15="http://schemas.microsoft.com/office/thememl/2012/main" xmlns="" name="Office Theme" id="{62F939B6-93AF-4DB8-9C6B-D6C7DFDC589F}" vid="{4A3C46E8-61CC-4603-A589-7422A47A8E4A}"/>
+      <thm15:themeFamily xmlns:thm15="http://schemas.microsoft.com/office/thememl/2012/main" name="Office Theme" id="{62F939B6-93AF-4DB8-9C6B-D6C7DFDC589F}" vid="{4A3C46E8-61CC-4603-A589-7422A47A8E4A}"/>
     </a:ext>
   </a:extLst>
 </a:theme>

</xml_diff>